<commit_message>
Cleanup, update examples, add LoRa P2P example
</commit_message>
<xml_diff>
--- a/assets/Structure.pptx
+++ b/assets/Structure.pptx
@@ -104,6 +104,11 @@
       </a:defRPr>
     </a:lvl9pPr>
   </p:defaultTextStyle>
+  <p:extLst>
+    <p:ext uri="{EFAFB233-063F-42B5-8137-9DF3F51BA10A}">
+      <p15:sldGuideLst xmlns:p15="http://schemas.microsoft.com/office/powerpoint/2012/main"/>
+    </p:ext>
+  </p:extLst>
 </p:presentation>
 </file>
 
@@ -256,7 +261,7 @@
           <a:p>
             <a:fld id="{0721F2AB-5CFE-4B03-B5A0-F53D623225EA}" type="datetimeFigureOut">
               <a:rPr lang="en-PH" smtClean="0"/>
-              <a:t>10/09/2021</a:t>
+              <a:t>16/11/2021</a:t>
             </a:fld>
             <a:endParaRPr lang="en-PH"/>
           </a:p>
@@ -456,7 +461,7 @@
           <a:p>
             <a:fld id="{0721F2AB-5CFE-4B03-B5A0-F53D623225EA}" type="datetimeFigureOut">
               <a:rPr lang="en-PH" smtClean="0"/>
-              <a:t>10/09/2021</a:t>
+              <a:t>16/11/2021</a:t>
             </a:fld>
             <a:endParaRPr lang="en-PH"/>
           </a:p>
@@ -666,7 +671,7 @@
           <a:p>
             <a:fld id="{0721F2AB-5CFE-4B03-B5A0-F53D623225EA}" type="datetimeFigureOut">
               <a:rPr lang="en-PH" smtClean="0"/>
-              <a:t>10/09/2021</a:t>
+              <a:t>16/11/2021</a:t>
             </a:fld>
             <a:endParaRPr lang="en-PH"/>
           </a:p>
@@ -866,7 +871,7 @@
           <a:p>
             <a:fld id="{0721F2AB-5CFE-4B03-B5A0-F53D623225EA}" type="datetimeFigureOut">
               <a:rPr lang="en-PH" smtClean="0"/>
-              <a:t>10/09/2021</a:t>
+              <a:t>16/11/2021</a:t>
             </a:fld>
             <a:endParaRPr lang="en-PH"/>
           </a:p>
@@ -1142,7 +1147,7 @@
           <a:p>
             <a:fld id="{0721F2AB-5CFE-4B03-B5A0-F53D623225EA}" type="datetimeFigureOut">
               <a:rPr lang="en-PH" smtClean="0"/>
-              <a:t>10/09/2021</a:t>
+              <a:t>16/11/2021</a:t>
             </a:fld>
             <a:endParaRPr lang="en-PH"/>
           </a:p>
@@ -1410,7 +1415,7 @@
           <a:p>
             <a:fld id="{0721F2AB-5CFE-4B03-B5A0-F53D623225EA}" type="datetimeFigureOut">
               <a:rPr lang="en-PH" smtClean="0"/>
-              <a:t>10/09/2021</a:t>
+              <a:t>16/11/2021</a:t>
             </a:fld>
             <a:endParaRPr lang="en-PH"/>
           </a:p>
@@ -1825,7 +1830,7 @@
           <a:p>
             <a:fld id="{0721F2AB-5CFE-4B03-B5A0-F53D623225EA}" type="datetimeFigureOut">
               <a:rPr lang="en-PH" smtClean="0"/>
-              <a:t>10/09/2021</a:t>
+              <a:t>16/11/2021</a:t>
             </a:fld>
             <a:endParaRPr lang="en-PH"/>
           </a:p>
@@ -1967,7 +1972,7 @@
           <a:p>
             <a:fld id="{0721F2AB-5CFE-4B03-B5A0-F53D623225EA}" type="datetimeFigureOut">
               <a:rPr lang="en-PH" smtClean="0"/>
-              <a:t>10/09/2021</a:t>
+              <a:t>16/11/2021</a:t>
             </a:fld>
             <a:endParaRPr lang="en-PH"/>
           </a:p>
@@ -2080,7 +2085,7 @@
           <a:p>
             <a:fld id="{0721F2AB-5CFE-4B03-B5A0-F53D623225EA}" type="datetimeFigureOut">
               <a:rPr lang="en-PH" smtClean="0"/>
-              <a:t>10/09/2021</a:t>
+              <a:t>16/11/2021</a:t>
             </a:fld>
             <a:endParaRPr lang="en-PH"/>
           </a:p>
@@ -2393,7 +2398,7 @@
           <a:p>
             <a:fld id="{0721F2AB-5CFE-4B03-B5A0-F53D623225EA}" type="datetimeFigureOut">
               <a:rPr lang="en-PH" smtClean="0"/>
-              <a:t>10/09/2021</a:t>
+              <a:t>16/11/2021</a:t>
             </a:fld>
             <a:endParaRPr lang="en-PH"/>
           </a:p>
@@ -2682,7 +2687,7 @@
           <a:p>
             <a:fld id="{0721F2AB-5CFE-4B03-B5A0-F53D623225EA}" type="datetimeFigureOut">
               <a:rPr lang="en-PH" smtClean="0"/>
-              <a:t>10/09/2021</a:t>
+              <a:t>16/11/2021</a:t>
             </a:fld>
             <a:endParaRPr lang="en-PH"/>
           </a:p>
@@ -2925,7 +2930,7 @@
           <a:p>
             <a:fld id="{0721F2AB-5CFE-4B03-B5A0-F53D623225EA}" type="datetimeFigureOut">
               <a:rPr lang="en-PH" smtClean="0"/>
-              <a:t>10/09/2021</a:t>
+              <a:t>16/11/2021</a:t>
             </a:fld>
             <a:endParaRPr lang="en-PH"/>
           </a:p>
@@ -3733,7 +3738,7 @@
         </p:nvSpPr>
         <p:spPr>
           <a:xfrm>
-            <a:off x="8237941" y="1827913"/>
+            <a:off x="8267537" y="1756865"/>
             <a:ext cx="2369127" cy="618715"/>
           </a:xfrm>
           <a:prstGeom prst="rect">
@@ -3793,7 +3798,7 @@
         </p:nvSpPr>
         <p:spPr>
           <a:xfrm>
-            <a:off x="8237940" y="2775857"/>
+            <a:off x="8267537" y="2609497"/>
             <a:ext cx="2369127" cy="618715"/>
           </a:xfrm>
           <a:prstGeom prst="rect">
@@ -3853,7 +3858,7 @@
         </p:nvSpPr>
         <p:spPr>
           <a:xfrm>
-            <a:off x="8267538" y="3723801"/>
+            <a:off x="8267538" y="3462129"/>
             <a:ext cx="2369127" cy="618715"/>
           </a:xfrm>
           <a:prstGeom prst="rect">
@@ -3913,7 +3918,7 @@
         </p:nvSpPr>
         <p:spPr>
           <a:xfrm>
-            <a:off x="8267538" y="4671745"/>
+            <a:off x="8267538" y="4323339"/>
             <a:ext cx="2369127" cy="618715"/>
           </a:xfrm>
           <a:prstGeom prst="rect">
@@ -3976,8 +3981,8 @@
         </p:nvCxnSpPr>
         <p:spPr>
           <a:xfrm>
-            <a:off x="4173517" y="879969"/>
-            <a:ext cx="4094021" cy="332694"/>
+            <a:off x="4173515" y="895655"/>
+            <a:ext cx="4094023" cy="317008"/>
           </a:xfrm>
           <a:prstGeom prst="straightConnector1">
             <a:avLst/>
@@ -4018,8 +4023,8 @@
         </p:nvCxnSpPr>
         <p:spPr>
           <a:xfrm>
-            <a:off x="4173517" y="1522020"/>
-            <a:ext cx="4064424" cy="615251"/>
+            <a:off x="4173515" y="1545356"/>
+            <a:ext cx="4094022" cy="520867"/>
           </a:xfrm>
           <a:prstGeom prst="straightConnector1">
             <a:avLst/>
@@ -4062,7 +4067,7 @@
         <p:spPr>
           <a:xfrm>
             <a:off x="4173517" y="2137270"/>
-            <a:ext cx="4064423" cy="947945"/>
+            <a:ext cx="4094020" cy="781585"/>
           </a:xfrm>
           <a:prstGeom prst="straightConnector1">
             <a:avLst/>
@@ -4105,7 +4110,7 @@
         <p:spPr>
           <a:xfrm>
             <a:off x="4173517" y="2137270"/>
-            <a:ext cx="4094021" cy="1895889"/>
+            <a:ext cx="4094021" cy="1634217"/>
           </a:xfrm>
           <a:prstGeom prst="straightConnector1">
             <a:avLst/>
@@ -4148,7 +4153,7 @@
         <p:spPr>
           <a:xfrm>
             <a:off x="4173517" y="2137270"/>
-            <a:ext cx="4094021" cy="2843833"/>
+            <a:ext cx="4094021" cy="2495427"/>
           </a:xfrm>
           <a:prstGeom prst="straightConnector1">
             <a:avLst/>
@@ -4172,144 +4177,6 @@
           </a:fontRef>
         </p:style>
       </p:cxnSp>
-      <p:cxnSp>
-        <p:nvCxnSpPr>
-          <p:cNvPr id="58" name="Connector: Elbow 57">
-            <a:extLst>
-              <a:ext uri="{FF2B5EF4-FFF2-40B4-BE49-F238E27FC236}">
-                <a16:creationId xmlns:a16="http://schemas.microsoft.com/office/drawing/2014/main" id="{208C6219-7EBE-417D-8D38-B9512685EC7C}"/>
-              </a:ext>
-            </a:extLst>
-          </p:cNvPr>
-          <p:cNvCxnSpPr>
-            <a:cxnSpLocks/>
-            <a:stCxn id="8" idx="1"/>
-            <a:endCxn id="11" idx="1"/>
-          </p:cNvCxnSpPr>
-          <p:nvPr/>
-        </p:nvCxnSpPr>
-        <p:spPr>
-          <a:xfrm rot="10800000" flipV="1">
-            <a:off x="1804388" y="2137270"/>
-            <a:ext cx="2" cy="2843832"/>
-          </a:xfrm>
-          <a:prstGeom prst="bentConnector3">
-            <a:avLst>
-              <a:gd name="adj1" fmla="val 11430100000"/>
-            </a:avLst>
-          </a:prstGeom>
-          <a:ln w="38100">
-            <a:headEnd type="triangle"/>
-            <a:tailEnd type="triangle"/>
-          </a:ln>
-        </p:spPr>
-        <p:style>
-          <a:lnRef idx="1">
-            <a:schemeClr val="accent1"/>
-          </a:lnRef>
-          <a:fillRef idx="0">
-            <a:schemeClr val="accent1"/>
-          </a:fillRef>
-          <a:effectRef idx="0">
-            <a:schemeClr val="accent1"/>
-          </a:effectRef>
-          <a:fontRef idx="minor">
-            <a:schemeClr val="tx1"/>
-          </a:fontRef>
-        </p:style>
-      </p:cxnSp>
-      <p:cxnSp>
-        <p:nvCxnSpPr>
-          <p:cNvPr id="60" name="Connector: Elbow 59">
-            <a:extLst>
-              <a:ext uri="{FF2B5EF4-FFF2-40B4-BE49-F238E27FC236}">
-                <a16:creationId xmlns:a16="http://schemas.microsoft.com/office/drawing/2014/main" id="{7CAD88D4-2038-40E5-B161-8FBB422D94F3}"/>
-              </a:ext>
-            </a:extLst>
-          </p:cNvPr>
-          <p:cNvCxnSpPr>
-            <a:cxnSpLocks/>
-            <a:stCxn id="8" idx="1"/>
-            <a:endCxn id="10" idx="1"/>
-          </p:cNvCxnSpPr>
-          <p:nvPr/>
-        </p:nvCxnSpPr>
-        <p:spPr>
-          <a:xfrm rot="10800000" flipV="1">
-            <a:off x="1804390" y="2137269"/>
-            <a:ext cx="1" cy="1895889"/>
-          </a:xfrm>
-          <a:prstGeom prst="bentConnector3">
-            <a:avLst>
-              <a:gd name="adj1" fmla="val 22860100000"/>
-            </a:avLst>
-          </a:prstGeom>
-          <a:ln w="38100">
-            <a:headEnd type="triangle"/>
-            <a:tailEnd type="triangle"/>
-          </a:ln>
-        </p:spPr>
-        <p:style>
-          <a:lnRef idx="1">
-            <a:schemeClr val="accent1"/>
-          </a:lnRef>
-          <a:fillRef idx="0">
-            <a:schemeClr val="accent1"/>
-          </a:fillRef>
-          <a:effectRef idx="0">
-            <a:schemeClr val="accent1"/>
-          </a:effectRef>
-          <a:fontRef idx="minor">
-            <a:schemeClr val="tx1"/>
-          </a:fontRef>
-        </p:style>
-      </p:cxnSp>
-      <p:cxnSp>
-        <p:nvCxnSpPr>
-          <p:cNvPr id="65" name="Connector: Elbow 64">
-            <a:extLst>
-              <a:ext uri="{FF2B5EF4-FFF2-40B4-BE49-F238E27FC236}">
-                <a16:creationId xmlns:a16="http://schemas.microsoft.com/office/drawing/2014/main" id="{66F74CF6-41B7-4AF3-B984-10D505839EDA}"/>
-              </a:ext>
-            </a:extLst>
-          </p:cNvPr>
-          <p:cNvCxnSpPr>
-            <a:cxnSpLocks/>
-            <a:stCxn id="8" idx="1"/>
-            <a:endCxn id="9" idx="1"/>
-          </p:cNvCxnSpPr>
-          <p:nvPr/>
-        </p:nvCxnSpPr>
-        <p:spPr>
-          <a:xfrm rot="10800000" flipV="1">
-            <a:off x="1804390" y="2137269"/>
-            <a:ext cx="12700" cy="947945"/>
-          </a:xfrm>
-          <a:prstGeom prst="bentConnector3">
-            <a:avLst>
-              <a:gd name="adj1" fmla="val 1800000"/>
-            </a:avLst>
-          </a:prstGeom>
-          <a:ln w="38100">
-            <a:headEnd type="triangle"/>
-            <a:tailEnd type="triangle"/>
-          </a:ln>
-        </p:spPr>
-        <p:style>
-          <a:lnRef idx="1">
-            <a:schemeClr val="accent1"/>
-          </a:lnRef>
-          <a:fillRef idx="0">
-            <a:schemeClr val="accent1"/>
-          </a:fillRef>
-          <a:effectRef idx="0">
-            <a:schemeClr val="accent1"/>
-          </a:effectRef>
-          <a:fontRef idx="minor">
-            <a:schemeClr val="tx1"/>
-          </a:fontRef>
-        </p:style>
-      </p:cxnSp>
       <p:sp>
         <p:nvSpPr>
           <p:cNvPr id="80" name="Rectangle 79">
@@ -4324,7 +4191,7 @@
         </p:nvSpPr>
         <p:spPr>
           <a:xfrm>
-            <a:off x="8269535" y="5538930"/>
+            <a:off x="8269534" y="5337672"/>
             <a:ext cx="2369127" cy="618715"/>
           </a:xfrm>
           <a:prstGeom prst="rect">
@@ -4380,16 +4247,232 @@
         </p:nvCxnSpPr>
         <p:spPr>
           <a:xfrm rot="10800000" flipH="1" flipV="1">
-            <a:off x="1804389" y="2137270"/>
-            <a:ext cx="6465145" cy="3711018"/>
+            <a:off x="1804390" y="2137270"/>
+            <a:ext cx="6465144" cy="3509760"/>
           </a:xfrm>
           <a:prstGeom prst="bentConnector3">
             <a:avLst>
-              <a:gd name="adj1" fmla="val -3536"/>
+              <a:gd name="adj1" fmla="val -22680"/>
             </a:avLst>
           </a:prstGeom>
           <a:ln w="38100">
             <a:headEnd type="triangle"/>
+            <a:tailEnd type="triangle"/>
+          </a:ln>
+        </p:spPr>
+        <p:style>
+          <a:lnRef idx="1">
+            <a:schemeClr val="accent1"/>
+          </a:lnRef>
+          <a:fillRef idx="0">
+            <a:schemeClr val="accent1"/>
+          </a:fillRef>
+          <a:effectRef idx="0">
+            <a:schemeClr val="accent1"/>
+          </a:effectRef>
+          <a:fontRef idx="minor">
+            <a:schemeClr val="tx1"/>
+          </a:fontRef>
+        </p:style>
+      </p:cxnSp>
+      <p:sp>
+        <p:nvSpPr>
+          <p:cNvPr id="44" name="Rectangle 43">
+            <a:extLst>
+              <a:ext uri="{FF2B5EF4-FFF2-40B4-BE49-F238E27FC236}">
+                <a16:creationId xmlns:a16="http://schemas.microsoft.com/office/drawing/2014/main" id="{E655D496-09DB-447B-B64B-7F680AF45808}"/>
+              </a:ext>
+            </a:extLst>
+          </p:cNvPr>
+          <p:cNvSpPr/>
+          <p:nvPr/>
+        </p:nvSpPr>
+        <p:spPr>
+          <a:xfrm>
+            <a:off x="8267538" y="6154180"/>
+            <a:ext cx="2369127" cy="618715"/>
+          </a:xfrm>
+          <a:prstGeom prst="rect">
+            <a:avLst/>
+          </a:prstGeom>
+        </p:spPr>
+        <p:style>
+          <a:lnRef idx="2">
+            <a:schemeClr val="accent1">
+              <a:shade val="50000"/>
+            </a:schemeClr>
+          </a:lnRef>
+          <a:fillRef idx="1">
+            <a:schemeClr val="accent1"/>
+          </a:fillRef>
+          <a:effectRef idx="0">
+            <a:schemeClr val="accent1"/>
+          </a:effectRef>
+          <a:fontRef idx="minor">
+            <a:schemeClr val="lt1"/>
+          </a:fontRef>
+        </p:style>
+        <p:txBody>
+          <a:bodyPr rtlCol="0" anchor="ctr"/>
+          <a:lstStyle/>
+          <a:p>
+            <a:pPr algn="ctr"/>
+            <a:r>
+              <a:rPr lang="en-PH" dirty="0"/>
+              <a:t>User AT Commands</a:t>
+            </a:r>
+          </a:p>
+        </p:txBody>
+      </p:sp>
+      <p:cxnSp>
+        <p:nvCxnSpPr>
+          <p:cNvPr id="64" name="Connector: Elbow 63">
+            <a:extLst>
+              <a:ext uri="{FF2B5EF4-FFF2-40B4-BE49-F238E27FC236}">
+                <a16:creationId xmlns:a16="http://schemas.microsoft.com/office/drawing/2014/main" id="{FE1FA826-CD38-4E88-A965-5E536DB24AB7}"/>
+              </a:ext>
+            </a:extLst>
+          </p:cNvPr>
+          <p:cNvCxnSpPr>
+            <a:stCxn id="10" idx="1"/>
+          </p:cNvCxnSpPr>
+          <p:nvPr/>
+        </p:nvCxnSpPr>
+        <p:spPr>
+          <a:xfrm rot="10800000">
+            <a:off x="895927" y="3085215"/>
+            <a:ext cx="908462" cy="947945"/>
+          </a:xfrm>
+          <a:prstGeom prst="bentConnector2">
+            <a:avLst/>
+          </a:prstGeom>
+          <a:ln w="38100">
+            <a:tailEnd type="triangle"/>
+          </a:ln>
+        </p:spPr>
+        <p:style>
+          <a:lnRef idx="1">
+            <a:schemeClr val="accent1"/>
+          </a:lnRef>
+          <a:fillRef idx="0">
+            <a:schemeClr val="accent1"/>
+          </a:fillRef>
+          <a:effectRef idx="0">
+            <a:schemeClr val="accent1"/>
+          </a:effectRef>
+          <a:fontRef idx="minor">
+            <a:schemeClr val="tx1"/>
+          </a:fontRef>
+        </p:style>
+      </p:cxnSp>
+      <p:cxnSp>
+        <p:nvCxnSpPr>
+          <p:cNvPr id="68" name="Connector: Elbow 67">
+            <a:extLst>
+              <a:ext uri="{FF2B5EF4-FFF2-40B4-BE49-F238E27FC236}">
+                <a16:creationId xmlns:a16="http://schemas.microsoft.com/office/drawing/2014/main" id="{E4FF5C2C-839C-462F-AB85-C0248C6E59D3}"/>
+              </a:ext>
+            </a:extLst>
+          </p:cNvPr>
+          <p:cNvCxnSpPr>
+            <a:cxnSpLocks/>
+            <a:stCxn id="9" idx="1"/>
+          </p:cNvCxnSpPr>
+          <p:nvPr/>
+        </p:nvCxnSpPr>
+        <p:spPr>
+          <a:xfrm rot="10800000">
+            <a:off x="895928" y="2122001"/>
+            <a:ext cx="908463" cy="963214"/>
+          </a:xfrm>
+          <a:prstGeom prst="bentConnector2">
+            <a:avLst/>
+          </a:prstGeom>
+          <a:ln w="38100">
+            <a:tailEnd type="triangle"/>
+          </a:ln>
+        </p:spPr>
+        <p:style>
+          <a:lnRef idx="1">
+            <a:schemeClr val="accent1"/>
+          </a:lnRef>
+          <a:fillRef idx="0">
+            <a:schemeClr val="accent1"/>
+          </a:fillRef>
+          <a:effectRef idx="0">
+            <a:schemeClr val="accent1"/>
+          </a:effectRef>
+          <a:fontRef idx="minor">
+            <a:schemeClr val="tx1"/>
+          </a:fontRef>
+        </p:style>
+      </p:cxnSp>
+      <p:cxnSp>
+        <p:nvCxnSpPr>
+          <p:cNvPr id="71" name="Connector: Elbow 70">
+            <a:extLst>
+              <a:ext uri="{FF2B5EF4-FFF2-40B4-BE49-F238E27FC236}">
+                <a16:creationId xmlns:a16="http://schemas.microsoft.com/office/drawing/2014/main" id="{E22C287B-6571-4409-9236-17ACAA5A4F7C}"/>
+              </a:ext>
+            </a:extLst>
+          </p:cNvPr>
+          <p:cNvCxnSpPr>
+            <a:cxnSpLocks/>
+          </p:cNvCxnSpPr>
+          <p:nvPr/>
+        </p:nvCxnSpPr>
+        <p:spPr>
+          <a:xfrm rot="10800000">
+            <a:off x="893929" y="4043553"/>
+            <a:ext cx="908463" cy="963214"/>
+          </a:xfrm>
+          <a:prstGeom prst="bentConnector2">
+            <a:avLst/>
+          </a:prstGeom>
+          <a:ln w="38100">
+            <a:tailEnd type="triangle"/>
+          </a:ln>
+        </p:spPr>
+        <p:style>
+          <a:lnRef idx="1">
+            <a:schemeClr val="accent1"/>
+          </a:lnRef>
+          <a:fillRef idx="0">
+            <a:schemeClr val="accent1"/>
+          </a:fillRef>
+          <a:effectRef idx="0">
+            <a:schemeClr val="accent1"/>
+          </a:effectRef>
+          <a:fontRef idx="minor">
+            <a:schemeClr val="tx1"/>
+          </a:fontRef>
+        </p:style>
+      </p:cxnSp>
+      <p:cxnSp>
+        <p:nvCxnSpPr>
+          <p:cNvPr id="72" name="Connector: Elbow 71">
+            <a:extLst>
+              <a:ext uri="{FF2B5EF4-FFF2-40B4-BE49-F238E27FC236}">
+                <a16:creationId xmlns:a16="http://schemas.microsoft.com/office/drawing/2014/main" id="{E9FE5BCD-209A-4924-8157-E44FA88C5434}"/>
+              </a:ext>
+            </a:extLst>
+          </p:cNvPr>
+          <p:cNvCxnSpPr>
+            <a:cxnSpLocks/>
+            <a:stCxn id="11" idx="2"/>
+            <a:endCxn id="44" idx="1"/>
+          </p:cNvCxnSpPr>
+          <p:nvPr/>
+        </p:nvCxnSpPr>
+        <p:spPr>
+          <a:xfrm rot="16200000" flipH="1">
+            <a:off x="5041706" y="3237705"/>
+            <a:ext cx="1173079" cy="5278586"/>
+          </a:xfrm>
+          <a:prstGeom prst="bentConnector2">
+            <a:avLst/>
+          </a:prstGeom>
+          <a:ln w="38100">
             <a:tailEnd type="triangle"/>
           </a:ln>
         </p:spPr>

</xml_diff>